<commit_message>
Fehler korrigiert und Folien ergänzt
Final-Vers.
</commit_message>
<xml_diff>
--- a/doku/präsentation nicht komplett/vCity-Präsentation.pptx
+++ b/doku/präsentation nicht komplett/vCity-Präsentation.pptx
@@ -188,7 +188,7 @@
   </p:defaultTextStyle>
   <p:extLst>
     <p:ext uri="{EFAFB233-063F-42B5-8137-9DF3F51BA10A}">
-      <p15:sldGuideLst xmlns:p15="http://schemas.microsoft.com/office/powerpoint/2012/main" xmlns="">
+      <p15:sldGuideLst xmlns="" xmlns:p15="http://schemas.microsoft.com/office/powerpoint/2012/main">
         <p15:guide id="1" orient="horz" pos="2160">
           <p15:clr>
             <a:srgbClr val="A4A3A4"/>
@@ -448,7 +448,7 @@
             <a:fld id="{B83A044C-E8EF-4CD0-9F6B-22623A7684E2}" type="slidenum">
               <a:rPr lang="de-DE" smtClean="0"/>
               <a:pPr/>
-              <a:t>‹#›</a:t>
+              <a:t>‹Nr.›</a:t>
             </a:fld>
             <a:endParaRPr lang="de-DE"/>
           </a:p>
@@ -2551,7 +2551,7 @@
             <a:fld id="{02075A8B-51D4-4999-A4F2-B3FAC6295E4D}" type="slidenum">
               <a:rPr lang="de-DE" smtClean="0"/>
               <a:pPr/>
-              <a:t>‹#›</a:t>
+              <a:t>‹Nr.›</a:t>
             </a:fld>
             <a:endParaRPr lang="de-DE" dirty="0"/>
           </a:p>
@@ -2732,7 +2732,7 @@
             <a:fld id="{02075A8B-51D4-4999-A4F2-B3FAC6295E4D}" type="slidenum">
               <a:rPr lang="de-DE" smtClean="0"/>
               <a:pPr/>
-              <a:t>‹#›</a:t>
+              <a:t>‹Nr.›</a:t>
             </a:fld>
             <a:endParaRPr lang="de-DE"/>
           </a:p>
@@ -2918,7 +2918,7 @@
             <a:fld id="{02075A8B-51D4-4999-A4F2-B3FAC6295E4D}" type="slidenum">
               <a:rPr lang="de-DE" smtClean="0"/>
               <a:pPr/>
-              <a:t>‹#›</a:t>
+              <a:t>‹Nr.›</a:t>
             </a:fld>
             <a:endParaRPr lang="de-DE"/>
           </a:p>
@@ -3069,7 +3069,7 @@
             <a:fld id="{02075A8B-51D4-4999-A4F2-B3FAC6295E4D}" type="slidenum">
               <a:rPr lang="de-DE" smtClean="0"/>
               <a:pPr/>
-              <a:t>‹#›</a:t>
+              <a:t>‹Nr.›</a:t>
             </a:fld>
             <a:endParaRPr lang="de-DE"/>
           </a:p>
@@ -3325,7 +3325,7 @@
             <a:fld id="{02075A8B-51D4-4999-A4F2-B3FAC6295E4D}" type="slidenum">
               <a:rPr lang="de-DE" smtClean="0"/>
               <a:pPr/>
-              <a:t>‹#›</a:t>
+              <a:t>‹Nr.›</a:t>
             </a:fld>
             <a:endParaRPr lang="de-DE"/>
           </a:p>
@@ -3735,7 +3735,7 @@
             <a:fld id="{02075A8B-51D4-4999-A4F2-B3FAC6295E4D}" type="slidenum">
               <a:rPr lang="de-DE" smtClean="0"/>
               <a:pPr/>
-              <a:t>‹#›</a:t>
+              <a:t>‹Nr.›</a:t>
             </a:fld>
             <a:endParaRPr lang="de-DE"/>
           </a:p>
@@ -4182,7 +4182,7 @@
             <a:fld id="{02075A8B-51D4-4999-A4F2-B3FAC6295E4D}" type="slidenum">
               <a:rPr lang="de-DE" smtClean="0"/>
               <a:pPr/>
-              <a:t>‹#›</a:t>
+              <a:t>‹Nr.›</a:t>
             </a:fld>
             <a:endParaRPr lang="de-DE"/>
           </a:p>
@@ -4284,7 +4284,7 @@
             <a:fld id="{02075A8B-51D4-4999-A4F2-B3FAC6295E4D}" type="slidenum">
               <a:rPr lang="de-DE" smtClean="0"/>
               <a:pPr/>
-              <a:t>‹#›</a:t>
+              <a:t>‹Nr.›</a:t>
             </a:fld>
             <a:endParaRPr lang="de-DE"/>
           </a:p>
@@ -4406,7 +4406,7 @@
             <a:fld id="{02075A8B-51D4-4999-A4F2-B3FAC6295E4D}" type="slidenum">
               <a:rPr lang="de-DE" smtClean="0"/>
               <a:pPr/>
-              <a:t>‹#›</a:t>
+              <a:t>‹Nr.›</a:t>
             </a:fld>
             <a:endParaRPr lang="de-DE"/>
           </a:p>
@@ -4681,7 +4681,7 @@
             <a:fld id="{02075A8B-51D4-4999-A4F2-B3FAC6295E4D}" type="slidenum">
               <a:rPr lang="de-DE" smtClean="0"/>
               <a:pPr/>
-              <a:t>‹#›</a:t>
+              <a:t>‹Nr.›</a:t>
             </a:fld>
             <a:endParaRPr lang="de-DE"/>
           </a:p>
@@ -4906,7 +4906,7 @@
             <a:fld id="{02075A8B-51D4-4999-A4F2-B3FAC6295E4D}" type="slidenum">
               <a:rPr lang="de-DE" smtClean="0"/>
               <a:pPr/>
-              <a:t>‹#›</a:t>
+              <a:t>‹Nr.›</a:t>
             </a:fld>
             <a:endParaRPr lang="de-DE"/>
           </a:p>
@@ -6027,7 +6027,7 @@
             <a:fld id="{02075A8B-51D4-4999-A4F2-B3FAC6295E4D}" type="slidenum">
               <a:rPr lang="de-DE" smtClean="0"/>
               <a:pPr/>
-              <a:t>‹#›</a:t>
+              <a:t>‹Nr.›</a:t>
             </a:fld>
             <a:endParaRPr lang="de-DE"/>
           </a:p>
@@ -8411,6 +8411,171 @@
           </a:p>
         </p:txBody>
       </p:sp>
+      <p:sp>
+        <p:nvSpPr>
+          <p:cNvPr id="11" name="Inhaltsplatzhalter 1"/>
+          <p:cNvSpPr>
+            <a:spLocks noGrp="1"/>
+          </p:cNvSpPr>
+          <p:nvPr>
+            <p:ph idx="1"/>
+          </p:nvPr>
+        </p:nvSpPr>
+        <p:spPr>
+          <a:xfrm>
+            <a:off x="3563888" y="3950943"/>
+            <a:ext cx="4824536" cy="2124483"/>
+          </a:xfrm>
+        </p:spPr>
+        <p:txBody>
+          <a:bodyPr>
+            <a:normAutofit fontScale="92500" lnSpcReduction="10000"/>
+          </a:bodyPr>
+          <a:lstStyle/>
+          <a:p>
+            <a:r>
+              <a:rPr lang="de-DE" sz="2400" dirty="0" smtClean="0"/>
+              <a:t>CityGML einlesen</a:t>
+            </a:r>
+            <a:endParaRPr lang="de-DE" sz="2400" dirty="0" smtClean="0"/>
+          </a:p>
+          <a:p>
+            <a:r>
+              <a:rPr lang="de-DE" sz="2400" dirty="0" smtClean="0"/>
+              <a:t>Koordinaten transformieren</a:t>
+            </a:r>
+          </a:p>
+          <a:p>
+            <a:r>
+              <a:rPr lang="de-DE" sz="2400" dirty="0" smtClean="0"/>
+              <a:t>Polygone-&gt;Vertices umwandeln</a:t>
+            </a:r>
+          </a:p>
+          <a:p>
+            <a:pPr marL="109728" indent="0">
+              <a:buNone/>
+            </a:pPr>
+            <a:r>
+              <a:rPr lang="de-DE" sz="2400" dirty="0"/>
+              <a:t> </a:t>
+            </a:r>
+            <a:r>
+              <a:rPr lang="de-DE" sz="2400" dirty="0" smtClean="0"/>
+              <a:t>          </a:t>
+            </a:r>
+          </a:p>
+          <a:p>
+            <a:pPr marL="109728" indent="0">
+              <a:buNone/>
+            </a:pPr>
+            <a:r>
+              <a:rPr lang="de-DE" sz="2400" dirty="0"/>
+              <a:t>	</a:t>
+            </a:r>
+            <a:r>
+              <a:rPr lang="de-DE" sz="2400" dirty="0" smtClean="0"/>
+              <a:t>Building Objekt</a:t>
+            </a:r>
+            <a:endParaRPr lang="de-DE" dirty="0"/>
+          </a:p>
+        </p:txBody>
+      </p:sp>
+      <p:sp>
+        <p:nvSpPr>
+          <p:cNvPr id="2" name="Abgerundetes Rechteck 1"/>
+          <p:cNvSpPr/>
+          <p:nvPr/>
+        </p:nvSpPr>
+        <p:spPr>
+          <a:xfrm>
+            <a:off x="4211960" y="5474067"/>
+            <a:ext cx="2880320" cy="619229"/>
+          </a:xfrm>
+          <a:prstGeom prst="roundRect">
+            <a:avLst/>
+          </a:prstGeom>
+          <a:noFill/>
+        </p:spPr>
+        <p:style>
+          <a:lnRef idx="2">
+            <a:schemeClr val="accent1">
+              <a:shade val="50000"/>
+            </a:schemeClr>
+          </a:lnRef>
+          <a:fillRef idx="1">
+            <a:schemeClr val="accent1"/>
+          </a:fillRef>
+          <a:effectRef idx="0">
+            <a:schemeClr val="accent1"/>
+          </a:effectRef>
+          <a:fontRef idx="minor">
+            <a:schemeClr val="lt1"/>
+          </a:fontRef>
+        </p:style>
+        <p:txBody>
+          <a:bodyPr rtlCol="0" anchor="ctr"/>
+          <a:lstStyle/>
+          <a:p>
+            <a:pPr algn="ctr"/>
+            <a:endParaRPr lang="de-DE">
+              <a:solidFill>
+                <a:schemeClr val="accent1">
+                  <a:lumMod val="40000"/>
+                  <a:lumOff val="60000"/>
+                </a:schemeClr>
+              </a:solidFill>
+            </a:endParaRPr>
+          </a:p>
+        </p:txBody>
+      </p:sp>
+      <p:sp>
+        <p:nvSpPr>
+          <p:cNvPr id="12" name="Abgerundetes Rechteck 11"/>
+          <p:cNvSpPr/>
+          <p:nvPr/>
+        </p:nvSpPr>
+        <p:spPr>
+          <a:xfrm>
+            <a:off x="4211960" y="5625334"/>
+            <a:ext cx="2880320" cy="619229"/>
+          </a:xfrm>
+          <a:prstGeom prst="roundRect">
+            <a:avLst/>
+          </a:prstGeom>
+          <a:noFill/>
+        </p:spPr>
+        <p:style>
+          <a:lnRef idx="2">
+            <a:schemeClr val="accent1">
+              <a:shade val="50000"/>
+            </a:schemeClr>
+          </a:lnRef>
+          <a:fillRef idx="1">
+            <a:schemeClr val="accent1"/>
+          </a:fillRef>
+          <a:effectRef idx="0">
+            <a:schemeClr val="accent1"/>
+          </a:effectRef>
+          <a:fontRef idx="minor">
+            <a:schemeClr val="lt1"/>
+          </a:fontRef>
+        </p:style>
+        <p:txBody>
+          <a:bodyPr rtlCol="0" anchor="ctr"/>
+          <a:lstStyle/>
+          <a:p>
+            <a:pPr algn="ctr"/>
+            <a:endParaRPr lang="de-DE">
+              <a:solidFill>
+                <a:schemeClr val="accent1">
+                  <a:lumMod val="40000"/>
+                  <a:lumOff val="60000"/>
+                </a:schemeClr>
+              </a:solidFill>
+            </a:endParaRPr>
+          </a:p>
+        </p:txBody>
+      </p:sp>
     </p:spTree>
     <p:extLst>
       <p:ext uri="{BB962C8B-B14F-4D97-AF65-F5344CB8AC3E}">
@@ -8582,7 +8747,7 @@
         </p:blipFill>
         <p:spPr>
           <a:xfrm>
-            <a:off x="3236686" y="4180217"/>
+            <a:off x="3149012" y="3865006"/>
             <a:ext cx="5643736" cy="663666"/>
           </a:xfrm>
           <a:prstGeom prst="rect">
@@ -8590,6 +8755,261 @@
           </a:prstGeom>
         </p:spPr>
       </p:pic>
+      <p:sp>
+        <p:nvSpPr>
+          <p:cNvPr id="9" name="Inhaltsplatzhalter 1"/>
+          <p:cNvSpPr>
+            <a:spLocks noGrp="1"/>
+          </p:cNvSpPr>
+          <p:nvPr>
+            <p:ph idx="1"/>
+          </p:nvPr>
+        </p:nvSpPr>
+        <p:spPr>
+          <a:xfrm>
+            <a:off x="457200" y="2564904"/>
+            <a:ext cx="5601478" cy="1872208"/>
+          </a:xfrm>
+        </p:spPr>
+        <p:txBody>
+          <a:bodyPr>
+            <a:normAutofit/>
+          </a:bodyPr>
+          <a:lstStyle/>
+          <a:p>
+            <a:r>
+              <a:rPr lang="de-DE" sz="2400" dirty="0" smtClean="0"/>
+              <a:t>Verwendet JOGL-Bibliothek</a:t>
+            </a:r>
+            <a:endParaRPr lang="de-DE" sz="2400" dirty="0" smtClean="0"/>
+          </a:p>
+          <a:p>
+            <a:r>
+              <a:rPr lang="de-DE" sz="2400" dirty="0" smtClean="0"/>
+              <a:t>Triangulierung per tessellator</a:t>
+            </a:r>
+          </a:p>
+          <a:p>
+            <a:r>
+              <a:rPr lang="de-DE" dirty="0" smtClean="0"/>
+              <a:t>Dreiecke in ein ArrayList speichern</a:t>
+            </a:r>
+            <a:endParaRPr lang="de-DE" dirty="0"/>
+          </a:p>
+        </p:txBody>
+      </p:sp>
+      <p:sp>
+        <p:nvSpPr>
+          <p:cNvPr id="10" name="Inhaltsplatzhalter 1"/>
+          <p:cNvSpPr txBox="1">
+            <a:spLocks/>
+          </p:cNvSpPr>
+          <p:nvPr/>
+        </p:nvSpPr>
+        <p:spPr>
+          <a:xfrm>
+            <a:off x="457200" y="4627116"/>
+            <a:ext cx="7643192" cy="1872208"/>
+          </a:xfrm>
+          <a:prstGeom prst="rect">
+            <a:avLst/>
+          </a:prstGeom>
+        </p:spPr>
+        <p:txBody>
+          <a:bodyPr vert="horz">
+            <a:normAutofit/>
+          </a:bodyPr>
+          <a:lstStyle>
+            <a:lvl1pPr marL="365760" indent="-256032" algn="l" rtl="0" eaLnBrk="1" latinLnBrk="0" hangingPunct="1">
+              <a:spcBef>
+                <a:spcPts val="400"/>
+              </a:spcBef>
+              <a:spcAft>
+                <a:spcPts val="0"/>
+              </a:spcAft>
+              <a:buClr>
+                <a:schemeClr val="accent1"/>
+              </a:buClr>
+              <a:buSzPct val="68000"/>
+              <a:buFont typeface="Wingdings 3"/>
+              <a:buChar char=""/>
+              <a:defRPr kumimoji="0" sz="2700" kern="1200">
+                <a:solidFill>
+                  <a:schemeClr val="tx1"/>
+                </a:solidFill>
+                <a:latin typeface="+mn-lt"/>
+                <a:ea typeface="+mn-ea"/>
+                <a:cs typeface="+mn-cs"/>
+              </a:defRPr>
+            </a:lvl1pPr>
+            <a:lvl2pPr marL="621792" indent="-228600" algn="l" rtl="0" eaLnBrk="1" latinLnBrk="0" hangingPunct="1">
+              <a:spcBef>
+                <a:spcPts val="324"/>
+              </a:spcBef>
+              <a:buClr>
+                <a:schemeClr val="accent1"/>
+              </a:buClr>
+              <a:buFont typeface="Verdana"/>
+              <a:buChar char="◦"/>
+              <a:defRPr kumimoji="0" sz="2300" kern="1200">
+                <a:solidFill>
+                  <a:schemeClr val="tx1"/>
+                </a:solidFill>
+                <a:latin typeface="+mn-lt"/>
+                <a:ea typeface="+mn-ea"/>
+                <a:cs typeface="+mn-cs"/>
+              </a:defRPr>
+            </a:lvl2pPr>
+            <a:lvl3pPr marL="859536" indent="-228600" algn="l" rtl="0" eaLnBrk="1" latinLnBrk="0" hangingPunct="1">
+              <a:spcBef>
+                <a:spcPts val="350"/>
+              </a:spcBef>
+              <a:buClr>
+                <a:schemeClr val="accent2"/>
+              </a:buClr>
+              <a:buSzPct val="100000"/>
+              <a:buFont typeface="Wingdings 2"/>
+              <a:buChar char=""/>
+              <a:defRPr kumimoji="0" sz="2100" kern="1200">
+                <a:solidFill>
+                  <a:schemeClr val="tx1"/>
+                </a:solidFill>
+                <a:latin typeface="+mn-lt"/>
+                <a:ea typeface="+mn-ea"/>
+                <a:cs typeface="+mn-cs"/>
+              </a:defRPr>
+            </a:lvl3pPr>
+            <a:lvl4pPr marL="1143000" indent="-228600" algn="l" rtl="0" eaLnBrk="1" latinLnBrk="0" hangingPunct="1">
+              <a:spcBef>
+                <a:spcPts val="350"/>
+              </a:spcBef>
+              <a:buClr>
+                <a:schemeClr val="accent2"/>
+              </a:buClr>
+              <a:buFont typeface="Wingdings 2"/>
+              <a:buChar char=""/>
+              <a:defRPr kumimoji="0" sz="1900" kern="1200">
+                <a:solidFill>
+                  <a:schemeClr val="tx1"/>
+                </a:solidFill>
+                <a:latin typeface="+mn-lt"/>
+                <a:ea typeface="+mn-ea"/>
+                <a:cs typeface="+mn-cs"/>
+              </a:defRPr>
+            </a:lvl4pPr>
+            <a:lvl5pPr marL="1371600" indent="-228600" algn="l" rtl="0" eaLnBrk="1" latinLnBrk="0" hangingPunct="1">
+              <a:spcBef>
+                <a:spcPts val="350"/>
+              </a:spcBef>
+              <a:buClr>
+                <a:schemeClr val="accent2"/>
+              </a:buClr>
+              <a:buFont typeface="Wingdings 2"/>
+              <a:buChar char=""/>
+              <a:defRPr kumimoji="0" sz="1800" kern="1200">
+                <a:solidFill>
+                  <a:schemeClr val="tx1"/>
+                </a:solidFill>
+                <a:latin typeface="+mn-lt"/>
+                <a:ea typeface="+mn-ea"/>
+                <a:cs typeface="+mn-cs"/>
+              </a:defRPr>
+            </a:lvl5pPr>
+            <a:lvl6pPr marL="1600200" indent="-228600" algn="l" rtl="0" eaLnBrk="1" latinLnBrk="0" hangingPunct="1">
+              <a:spcBef>
+                <a:spcPts val="350"/>
+              </a:spcBef>
+              <a:buClr>
+                <a:schemeClr val="accent3"/>
+              </a:buClr>
+              <a:buFont typeface="Wingdings 2"/>
+              <a:buChar char=""/>
+              <a:defRPr kumimoji="0" sz="1800" kern="1200">
+                <a:solidFill>
+                  <a:schemeClr val="tx1"/>
+                </a:solidFill>
+                <a:latin typeface="+mn-lt"/>
+                <a:ea typeface="+mn-ea"/>
+                <a:cs typeface="+mn-cs"/>
+              </a:defRPr>
+            </a:lvl6pPr>
+            <a:lvl7pPr marL="1828800" indent="-228600" algn="l" rtl="0" eaLnBrk="1" latinLnBrk="0" hangingPunct="1">
+              <a:spcBef>
+                <a:spcPts val="350"/>
+              </a:spcBef>
+              <a:buClr>
+                <a:schemeClr val="accent3"/>
+              </a:buClr>
+              <a:buFont typeface="Wingdings 2"/>
+              <a:buChar char=""/>
+              <a:defRPr kumimoji="0" sz="1600" kern="1200">
+                <a:solidFill>
+                  <a:schemeClr val="tx1"/>
+                </a:solidFill>
+                <a:latin typeface="+mn-lt"/>
+                <a:ea typeface="+mn-ea"/>
+                <a:cs typeface="+mn-cs"/>
+              </a:defRPr>
+            </a:lvl7pPr>
+            <a:lvl8pPr marL="2057400" indent="-228600" algn="l" rtl="0" eaLnBrk="1" latinLnBrk="0" hangingPunct="1">
+              <a:spcBef>
+                <a:spcPts val="350"/>
+              </a:spcBef>
+              <a:buClr>
+                <a:schemeClr val="accent3"/>
+              </a:buClr>
+              <a:buFont typeface="Wingdings 2"/>
+              <a:buChar char=""/>
+              <a:defRPr kumimoji="0" sz="1600" kern="1200">
+                <a:solidFill>
+                  <a:schemeClr val="tx1"/>
+                </a:solidFill>
+                <a:latin typeface="+mn-lt"/>
+                <a:ea typeface="+mn-ea"/>
+                <a:cs typeface="+mn-cs"/>
+              </a:defRPr>
+            </a:lvl8pPr>
+            <a:lvl9pPr marL="2286000" indent="-228600" algn="l" rtl="0" eaLnBrk="1" latinLnBrk="0" hangingPunct="1">
+              <a:spcBef>
+                <a:spcPts val="350"/>
+              </a:spcBef>
+              <a:buClr>
+                <a:schemeClr val="accent3"/>
+              </a:buClr>
+              <a:buFont typeface="Wingdings 2"/>
+              <a:buChar char=""/>
+              <a:defRPr kumimoji="0" sz="1600" kern="1200" baseline="0">
+                <a:solidFill>
+                  <a:schemeClr val="tx1"/>
+                </a:solidFill>
+                <a:latin typeface="+mn-lt"/>
+                <a:ea typeface="+mn-ea"/>
+                <a:cs typeface="+mn-cs"/>
+              </a:defRPr>
+            </a:lvl9pPr>
+            <a:extLst/>
+          </a:lstStyle>
+          <a:p>
+            <a:r>
+              <a:rPr lang="de-DE" sz="2400" dirty="0" smtClean="0"/>
+              <a:t>Wandle Koordinaten so um, dass sie näher am Ursprung des Koordinatensystems liegen</a:t>
+            </a:r>
+          </a:p>
+          <a:p>
+            <a:r>
+              <a:rPr lang="de-DE" sz="2400" dirty="0"/>
+              <a:t> </a:t>
+            </a:r>
+            <a:r>
+              <a:rPr lang="de-DE" sz="2400" dirty="0" smtClean="0"/>
+              <a:t>Neue Koordinaten in ein ArrayList weitergeben</a:t>
+            </a:r>
+          </a:p>
+          <a:p>
+            <a:endParaRPr lang="de-DE" dirty="0"/>
+          </a:p>
+        </p:txBody>
+      </p:sp>
     </p:spTree>
     <p:extLst>
       <p:ext uri="{BB962C8B-B14F-4D97-AF65-F5344CB8AC3E}">
@@ -8894,6 +9314,109 @@
           </a:prstGeom>
         </p:spPr>
       </p:pic>
+      <p:sp>
+        <p:nvSpPr>
+          <p:cNvPr id="6" name="Inhaltsplatzhalter 1"/>
+          <p:cNvSpPr>
+            <a:spLocks noGrp="1"/>
+          </p:cNvSpPr>
+          <p:nvPr>
+            <p:ph idx="1"/>
+          </p:nvPr>
+        </p:nvSpPr>
+        <p:spPr>
+          <a:xfrm>
+            <a:off x="1259632" y="3356992"/>
+            <a:ext cx="7776864" cy="2808312"/>
+          </a:xfrm>
+        </p:spPr>
+        <p:txBody>
+          <a:bodyPr>
+            <a:normAutofit fontScale="92500" lnSpcReduction="20000"/>
+          </a:bodyPr>
+          <a:lstStyle/>
+          <a:p>
+            <a:r>
+              <a:rPr lang="de-DE" sz="2400" dirty="0" smtClean="0"/>
+              <a:t>Verwendet GLU Bibliothek und erbt von GLUTessellatorCallbackAdapter</a:t>
+            </a:r>
+          </a:p>
+          <a:p>
+            <a:pPr marL="109728" indent="0">
+              <a:buNone/>
+            </a:pPr>
+            <a:endParaRPr lang="de-DE" sz="2400" dirty="0" smtClean="0"/>
+          </a:p>
+          <a:p>
+            <a:pPr marL="109728" indent="0">
+              <a:buNone/>
+            </a:pPr>
+            <a:r>
+              <a:rPr lang="de-DE" sz="2400" dirty="0" smtClean="0"/>
+              <a:t>Callback-Routinen </a:t>
+            </a:r>
+            <a:r>
+              <a:rPr lang="de-DE" sz="2400" dirty="0"/>
+              <a:t>bei der </a:t>
+            </a:r>
+            <a:r>
+              <a:rPr lang="de-DE" sz="2400" dirty="0" smtClean="0"/>
+              <a:t>Tessellierung</a:t>
+            </a:r>
+            <a:endParaRPr lang="de-DE" sz="2400" dirty="0"/>
+          </a:p>
+          <a:p>
+            <a:r>
+              <a:rPr lang="de-DE" sz="2400" dirty="0" smtClean="0"/>
+              <a:t>Beim </a:t>
+            </a:r>
+            <a:r>
+              <a:rPr lang="de-DE" sz="2400" dirty="0"/>
+              <a:t>Auftreten der Ereignisse</a:t>
+            </a:r>
+          </a:p>
+          <a:p>
+            <a:r>
+              <a:rPr lang="de-DE" sz="2400" dirty="0" smtClean="0"/>
+              <a:t>Beginn </a:t>
+            </a:r>
+            <a:r>
+              <a:rPr lang="de-DE" sz="2400" dirty="0"/>
+              <a:t>und Ende eines </a:t>
+            </a:r>
+            <a:r>
+              <a:rPr lang="de-DE" sz="2400" dirty="0" smtClean="0"/>
+              <a:t>Polygons</a:t>
+            </a:r>
+            <a:endParaRPr lang="de-DE" sz="2400" dirty="0"/>
+          </a:p>
+          <a:p>
+            <a:r>
+              <a:rPr lang="de-DE" sz="2400" dirty="0" smtClean="0"/>
+              <a:t>Spezifikation </a:t>
+            </a:r>
+            <a:r>
+              <a:rPr lang="de-DE" sz="2400" dirty="0"/>
+              <a:t>einer Ecke</a:t>
+            </a:r>
+          </a:p>
+          <a:p>
+            <a:r>
+              <a:rPr lang="de-DE" sz="2400" dirty="0" smtClean="0"/>
+              <a:t>Selbstdurchdringung </a:t>
+            </a:r>
+            <a:r>
+              <a:rPr lang="de-DE" sz="2400" dirty="0"/>
+              <a:t>eines </a:t>
+            </a:r>
+            <a:r>
+              <a:rPr lang="de-DE" sz="2400" dirty="0" smtClean="0"/>
+              <a:t>Polygons</a:t>
+            </a:r>
+            <a:endParaRPr lang="de-DE" sz="2400" dirty="0"/>
+          </a:p>
+        </p:txBody>
+      </p:sp>
     </p:spTree>
     <p:extLst>
       <p:ext uri="{BB962C8B-B14F-4D97-AF65-F5344CB8AC3E}">
@@ -9024,6 +9547,89 @@
           <a:xfrm>
             <a:off x="731640" y="2276872"/>
             <a:ext cx="2721915" cy="2562880"/>
+          </a:xfrm>
+          <a:prstGeom prst="rect">
+            <a:avLst/>
+          </a:prstGeom>
+        </p:spPr>
+      </p:pic>
+      <p:sp>
+        <p:nvSpPr>
+          <p:cNvPr id="6" name="Inhaltsplatzhalter 1"/>
+          <p:cNvSpPr>
+            <a:spLocks noGrp="1"/>
+          </p:cNvSpPr>
+          <p:nvPr>
+            <p:ph idx="1"/>
+          </p:nvPr>
+        </p:nvSpPr>
+        <p:spPr>
+          <a:xfrm>
+            <a:off x="3851920" y="1484784"/>
+            <a:ext cx="4608512" cy="2736304"/>
+          </a:xfrm>
+        </p:spPr>
+        <p:txBody>
+          <a:bodyPr>
+            <a:normAutofit lnSpcReduction="10000"/>
+          </a:bodyPr>
+          <a:lstStyle/>
+          <a:p>
+            <a:r>
+              <a:rPr lang="de-DE" sz="2400" dirty="0" smtClean="0"/>
+              <a:t>Sammlung gewonnener Vertices</a:t>
+            </a:r>
+          </a:p>
+          <a:p>
+            <a:r>
+              <a:rPr lang="de-DE" sz="2400" dirty="0" smtClean="0"/>
+              <a:t>Erstellung der Dreiecke/</a:t>
+            </a:r>
+            <a:r>
+              <a:rPr lang="de-DE" sz="2400" dirty="0" err="1" smtClean="0"/>
+              <a:t>Triangles</a:t>
+            </a:r>
+            <a:r>
+              <a:rPr lang="de-DE" sz="2400" dirty="0" smtClean="0"/>
+              <a:t> für die spätere Nutzung</a:t>
+            </a:r>
+          </a:p>
+          <a:p>
+            <a:r>
+              <a:rPr lang="de-DE" sz="2400" dirty="0" smtClean="0"/>
+              <a:t>Orientierung gegen die Uhrzeigersinn</a:t>
+            </a:r>
+            <a:endParaRPr lang="de-DE" sz="2400" dirty="0" smtClean="0"/>
+          </a:p>
+          <a:p>
+            <a:endParaRPr lang="de-DE" dirty="0"/>
+          </a:p>
+        </p:txBody>
+      </p:sp>
+      <p:pic>
+        <p:nvPicPr>
+          <p:cNvPr id="2" name="Grafik 1"/>
+          <p:cNvPicPr>
+            <a:picLocks noChangeAspect="1"/>
+          </p:cNvPicPr>
+          <p:nvPr/>
+        </p:nvPicPr>
+        <p:blipFill>
+          <a:blip r:embed="rId3">
+            <a:extLst>
+              <a:ext uri="{28A0092B-C50C-407E-A947-70E740481C1C}">
+                <a14:useLocalDpi xmlns:a14="http://schemas.microsoft.com/office/drawing/2010/main" val="0"/>
+              </a:ext>
+            </a:extLst>
+          </a:blip>
+          <a:stretch>
+            <a:fillRect/>
+          </a:stretch>
+        </p:blipFill>
+        <p:spPr>
+          <a:xfrm>
+            <a:off x="6534844" y="3230612"/>
+            <a:ext cx="2438400" cy="2438400"/>
           </a:xfrm>
           <a:prstGeom prst="rect">
             <a:avLst/>
@@ -9139,13 +9745,13 @@
       </p:sp>
       <p:pic>
         <p:nvPicPr>
-          <p:cNvPr id="8" name="Grafik 7"/>
+          <p:cNvPr id="2" name="Grafik 1"/>
           <p:cNvPicPr>
             <a:picLocks noChangeAspect="1"/>
           </p:cNvPicPr>
           <p:nvPr/>
         </p:nvPicPr>
-        <p:blipFill rotWithShape="1">
+        <p:blipFill>
           <a:blip r:embed="rId2">
             <a:extLst>
               <a:ext uri="{28A0092B-C50C-407E-A947-70E740481C1C}">
@@ -9153,13 +9759,14 @@
               </a:ext>
             </a:extLst>
           </a:blip>
-          <a:srcRect l="43026" t="41061" r="19393" b="46667"/>
-          <a:stretch/>
+          <a:stretch>
+            <a:fillRect/>
+          </a:stretch>
         </p:blipFill>
         <p:spPr>
           <a:xfrm>
-            <a:off x="352252" y="1484784"/>
-            <a:ext cx="3744416" cy="1172543"/>
+            <a:off x="539551" y="1412776"/>
+            <a:ext cx="4536505" cy="1440160"/>
           </a:xfrm>
           <a:prstGeom prst="rect">
             <a:avLst/>
@@ -9168,33 +9775,495 @@
       </p:pic>
       <p:pic>
         <p:nvPicPr>
-          <p:cNvPr id="9" name="Grafik 8"/>
+          <p:cNvPr id="6" name="Grafik 5"/>
           <p:cNvPicPr>
             <a:picLocks noChangeAspect="1"/>
           </p:cNvPicPr>
           <p:nvPr/>
         </p:nvPicPr>
-        <p:blipFill rotWithShape="1">
-          <a:blip r:embed="rId2">
+        <p:blipFill>
+          <a:blip r:embed="rId3">
             <a:extLst>
               <a:ext uri="{28A0092B-C50C-407E-A947-70E740481C1C}">
                 <a14:useLocalDpi xmlns:a14="http://schemas.microsoft.com/office/drawing/2010/main" val="0"/>
               </a:ext>
             </a:extLst>
           </a:blip>
-          <a:srcRect l="46702" t="68283" r="11067" b="17980"/>
-          <a:stretch/>
+          <a:stretch>
+            <a:fillRect/>
+          </a:stretch>
         </p:blipFill>
         <p:spPr>
           <a:xfrm>
-            <a:off x="4716016" y="4653136"/>
-            <a:ext cx="3785722" cy="1180867"/>
+            <a:off x="539551" y="4075007"/>
+            <a:ext cx="4088965" cy="1300257"/>
           </a:xfrm>
           <a:prstGeom prst="rect">
             <a:avLst/>
           </a:prstGeom>
         </p:spPr>
       </p:pic>
+      <p:sp>
+        <p:nvSpPr>
+          <p:cNvPr id="10" name="Inhaltsplatzhalter 1"/>
+          <p:cNvSpPr txBox="1">
+            <a:spLocks/>
+          </p:cNvSpPr>
+          <p:nvPr/>
+        </p:nvSpPr>
+        <p:spPr>
+          <a:xfrm>
+            <a:off x="5094312" y="1440852"/>
+            <a:ext cx="4081103" cy="1412084"/>
+          </a:xfrm>
+          <a:prstGeom prst="rect">
+            <a:avLst/>
+          </a:prstGeom>
+        </p:spPr>
+        <p:txBody>
+          <a:bodyPr vert="horz">
+            <a:normAutofit fontScale="92500" lnSpcReduction="10000"/>
+          </a:bodyPr>
+          <a:lstStyle>
+            <a:lvl1pPr marL="365760" indent="-256032" algn="l" rtl="0" eaLnBrk="1" latinLnBrk="0" hangingPunct="1">
+              <a:spcBef>
+                <a:spcPts val="400"/>
+              </a:spcBef>
+              <a:spcAft>
+                <a:spcPts val="0"/>
+              </a:spcAft>
+              <a:buClr>
+                <a:schemeClr val="accent1"/>
+              </a:buClr>
+              <a:buSzPct val="68000"/>
+              <a:buFont typeface="Wingdings 3"/>
+              <a:buChar char=""/>
+              <a:defRPr kumimoji="0" sz="2700" kern="1200">
+                <a:solidFill>
+                  <a:schemeClr val="tx1"/>
+                </a:solidFill>
+                <a:latin typeface="+mn-lt"/>
+                <a:ea typeface="+mn-ea"/>
+                <a:cs typeface="+mn-cs"/>
+              </a:defRPr>
+            </a:lvl1pPr>
+            <a:lvl2pPr marL="621792" indent="-228600" algn="l" rtl="0" eaLnBrk="1" latinLnBrk="0" hangingPunct="1">
+              <a:spcBef>
+                <a:spcPts val="324"/>
+              </a:spcBef>
+              <a:buClr>
+                <a:schemeClr val="accent1"/>
+              </a:buClr>
+              <a:buFont typeface="Verdana"/>
+              <a:buChar char="◦"/>
+              <a:defRPr kumimoji="0" sz="2300" kern="1200">
+                <a:solidFill>
+                  <a:schemeClr val="tx1"/>
+                </a:solidFill>
+                <a:latin typeface="+mn-lt"/>
+                <a:ea typeface="+mn-ea"/>
+                <a:cs typeface="+mn-cs"/>
+              </a:defRPr>
+            </a:lvl2pPr>
+            <a:lvl3pPr marL="859536" indent="-228600" algn="l" rtl="0" eaLnBrk="1" latinLnBrk="0" hangingPunct="1">
+              <a:spcBef>
+                <a:spcPts val="350"/>
+              </a:spcBef>
+              <a:buClr>
+                <a:schemeClr val="accent2"/>
+              </a:buClr>
+              <a:buSzPct val="100000"/>
+              <a:buFont typeface="Wingdings 2"/>
+              <a:buChar char=""/>
+              <a:defRPr kumimoji="0" sz="2100" kern="1200">
+                <a:solidFill>
+                  <a:schemeClr val="tx1"/>
+                </a:solidFill>
+                <a:latin typeface="+mn-lt"/>
+                <a:ea typeface="+mn-ea"/>
+                <a:cs typeface="+mn-cs"/>
+              </a:defRPr>
+            </a:lvl3pPr>
+            <a:lvl4pPr marL="1143000" indent="-228600" algn="l" rtl="0" eaLnBrk="1" latinLnBrk="0" hangingPunct="1">
+              <a:spcBef>
+                <a:spcPts val="350"/>
+              </a:spcBef>
+              <a:buClr>
+                <a:schemeClr val="accent2"/>
+              </a:buClr>
+              <a:buFont typeface="Wingdings 2"/>
+              <a:buChar char=""/>
+              <a:defRPr kumimoji="0" sz="1900" kern="1200">
+                <a:solidFill>
+                  <a:schemeClr val="tx1"/>
+                </a:solidFill>
+                <a:latin typeface="+mn-lt"/>
+                <a:ea typeface="+mn-ea"/>
+                <a:cs typeface="+mn-cs"/>
+              </a:defRPr>
+            </a:lvl4pPr>
+            <a:lvl5pPr marL="1371600" indent="-228600" algn="l" rtl="0" eaLnBrk="1" latinLnBrk="0" hangingPunct="1">
+              <a:spcBef>
+                <a:spcPts val="350"/>
+              </a:spcBef>
+              <a:buClr>
+                <a:schemeClr val="accent2"/>
+              </a:buClr>
+              <a:buFont typeface="Wingdings 2"/>
+              <a:buChar char=""/>
+              <a:defRPr kumimoji="0" sz="1800" kern="1200">
+                <a:solidFill>
+                  <a:schemeClr val="tx1"/>
+                </a:solidFill>
+                <a:latin typeface="+mn-lt"/>
+                <a:ea typeface="+mn-ea"/>
+                <a:cs typeface="+mn-cs"/>
+              </a:defRPr>
+            </a:lvl5pPr>
+            <a:lvl6pPr marL="1600200" indent="-228600" algn="l" rtl="0" eaLnBrk="1" latinLnBrk="0" hangingPunct="1">
+              <a:spcBef>
+                <a:spcPts val="350"/>
+              </a:spcBef>
+              <a:buClr>
+                <a:schemeClr val="accent3"/>
+              </a:buClr>
+              <a:buFont typeface="Wingdings 2"/>
+              <a:buChar char=""/>
+              <a:defRPr kumimoji="0" sz="1800" kern="1200">
+                <a:solidFill>
+                  <a:schemeClr val="tx1"/>
+                </a:solidFill>
+                <a:latin typeface="+mn-lt"/>
+                <a:ea typeface="+mn-ea"/>
+                <a:cs typeface="+mn-cs"/>
+              </a:defRPr>
+            </a:lvl6pPr>
+            <a:lvl7pPr marL="1828800" indent="-228600" algn="l" rtl="0" eaLnBrk="1" latinLnBrk="0" hangingPunct="1">
+              <a:spcBef>
+                <a:spcPts val="350"/>
+              </a:spcBef>
+              <a:buClr>
+                <a:schemeClr val="accent3"/>
+              </a:buClr>
+              <a:buFont typeface="Wingdings 2"/>
+              <a:buChar char=""/>
+              <a:defRPr kumimoji="0" sz="1600" kern="1200">
+                <a:solidFill>
+                  <a:schemeClr val="tx1"/>
+                </a:solidFill>
+                <a:latin typeface="+mn-lt"/>
+                <a:ea typeface="+mn-ea"/>
+                <a:cs typeface="+mn-cs"/>
+              </a:defRPr>
+            </a:lvl7pPr>
+            <a:lvl8pPr marL="2057400" indent="-228600" algn="l" rtl="0" eaLnBrk="1" latinLnBrk="0" hangingPunct="1">
+              <a:spcBef>
+                <a:spcPts val="350"/>
+              </a:spcBef>
+              <a:buClr>
+                <a:schemeClr val="accent3"/>
+              </a:buClr>
+              <a:buFont typeface="Wingdings 2"/>
+              <a:buChar char=""/>
+              <a:defRPr kumimoji="0" sz="1600" kern="1200">
+                <a:solidFill>
+                  <a:schemeClr val="tx1"/>
+                </a:solidFill>
+                <a:latin typeface="+mn-lt"/>
+                <a:ea typeface="+mn-ea"/>
+                <a:cs typeface="+mn-cs"/>
+              </a:defRPr>
+            </a:lvl8pPr>
+            <a:lvl9pPr marL="2286000" indent="-228600" algn="l" rtl="0" eaLnBrk="1" latinLnBrk="0" hangingPunct="1">
+              <a:spcBef>
+                <a:spcPts val="350"/>
+              </a:spcBef>
+              <a:buClr>
+                <a:schemeClr val="accent3"/>
+              </a:buClr>
+              <a:buFont typeface="Wingdings 2"/>
+              <a:buChar char=""/>
+              <a:defRPr kumimoji="0" sz="1600" kern="1200" baseline="0">
+                <a:solidFill>
+                  <a:schemeClr val="tx1"/>
+                </a:solidFill>
+                <a:latin typeface="+mn-lt"/>
+                <a:ea typeface="+mn-ea"/>
+                <a:cs typeface="+mn-cs"/>
+              </a:defRPr>
+            </a:lvl9pPr>
+            <a:extLst/>
+          </a:lstStyle>
+          <a:p>
+            <a:r>
+              <a:rPr lang="de-DE" sz="2400" dirty="0" smtClean="0"/>
+              <a:t>Daten in ein </a:t>
+            </a:r>
+            <a:r>
+              <a:rPr lang="de-DE" sz="2400" dirty="0" err="1" smtClean="0"/>
+              <a:t>csv</a:t>
+            </a:r>
+            <a:r>
+              <a:rPr lang="de-DE" sz="2400" dirty="0" smtClean="0"/>
+              <a:t>, </a:t>
+            </a:r>
+            <a:r>
+              <a:rPr lang="de-DE" sz="2400" dirty="0" err="1" smtClean="0"/>
+              <a:t>xml</a:t>
+            </a:r>
+            <a:r>
+              <a:rPr lang="de-DE" sz="2400" dirty="0" smtClean="0"/>
+              <a:t> oder </a:t>
+            </a:r>
+            <a:r>
+              <a:rPr lang="de-DE" sz="2400" dirty="0" err="1" smtClean="0"/>
+              <a:t>cgml</a:t>
+            </a:r>
+            <a:r>
+              <a:rPr lang="de-DE" sz="2400" dirty="0" smtClean="0"/>
+              <a:t> Datei exportieren</a:t>
+            </a:r>
+          </a:p>
+          <a:p>
+            <a:r>
+              <a:rPr lang="de-DE" sz="2400" dirty="0" smtClean="0"/>
+              <a:t>Enthält ID und Volume </a:t>
+            </a:r>
+          </a:p>
+          <a:p>
+            <a:endParaRPr lang="de-DE" sz="2400" dirty="0" smtClean="0"/>
+          </a:p>
+          <a:p>
+            <a:endParaRPr lang="de-DE" dirty="0"/>
+          </a:p>
+        </p:txBody>
+      </p:sp>
+      <p:sp>
+        <p:nvSpPr>
+          <p:cNvPr id="11" name="Inhaltsplatzhalter 1"/>
+          <p:cNvSpPr txBox="1">
+            <a:spLocks/>
+          </p:cNvSpPr>
+          <p:nvPr/>
+        </p:nvSpPr>
+        <p:spPr>
+          <a:xfrm>
+            <a:off x="4654536" y="3963180"/>
+            <a:ext cx="4231395" cy="1412084"/>
+          </a:xfrm>
+          <a:prstGeom prst="rect">
+            <a:avLst/>
+          </a:prstGeom>
+        </p:spPr>
+        <p:txBody>
+          <a:bodyPr vert="horz">
+            <a:normAutofit fontScale="85000" lnSpcReduction="10000"/>
+          </a:bodyPr>
+          <a:lstStyle>
+            <a:lvl1pPr marL="365760" indent="-256032" algn="l" rtl="0" eaLnBrk="1" latinLnBrk="0" hangingPunct="1">
+              <a:spcBef>
+                <a:spcPts val="400"/>
+              </a:spcBef>
+              <a:spcAft>
+                <a:spcPts val="0"/>
+              </a:spcAft>
+              <a:buClr>
+                <a:schemeClr val="accent1"/>
+              </a:buClr>
+              <a:buSzPct val="68000"/>
+              <a:buFont typeface="Wingdings 3"/>
+              <a:buChar char=""/>
+              <a:defRPr kumimoji="0" sz="2700" kern="1200">
+                <a:solidFill>
+                  <a:schemeClr val="tx1"/>
+                </a:solidFill>
+                <a:latin typeface="+mn-lt"/>
+                <a:ea typeface="+mn-ea"/>
+                <a:cs typeface="+mn-cs"/>
+              </a:defRPr>
+            </a:lvl1pPr>
+            <a:lvl2pPr marL="621792" indent="-228600" algn="l" rtl="0" eaLnBrk="1" latinLnBrk="0" hangingPunct="1">
+              <a:spcBef>
+                <a:spcPts val="324"/>
+              </a:spcBef>
+              <a:buClr>
+                <a:schemeClr val="accent1"/>
+              </a:buClr>
+              <a:buFont typeface="Verdana"/>
+              <a:buChar char="◦"/>
+              <a:defRPr kumimoji="0" sz="2300" kern="1200">
+                <a:solidFill>
+                  <a:schemeClr val="tx1"/>
+                </a:solidFill>
+                <a:latin typeface="+mn-lt"/>
+                <a:ea typeface="+mn-ea"/>
+                <a:cs typeface="+mn-cs"/>
+              </a:defRPr>
+            </a:lvl2pPr>
+            <a:lvl3pPr marL="859536" indent="-228600" algn="l" rtl="0" eaLnBrk="1" latinLnBrk="0" hangingPunct="1">
+              <a:spcBef>
+                <a:spcPts val="350"/>
+              </a:spcBef>
+              <a:buClr>
+                <a:schemeClr val="accent2"/>
+              </a:buClr>
+              <a:buSzPct val="100000"/>
+              <a:buFont typeface="Wingdings 2"/>
+              <a:buChar char=""/>
+              <a:defRPr kumimoji="0" sz="2100" kern="1200">
+                <a:solidFill>
+                  <a:schemeClr val="tx1"/>
+                </a:solidFill>
+                <a:latin typeface="+mn-lt"/>
+                <a:ea typeface="+mn-ea"/>
+                <a:cs typeface="+mn-cs"/>
+              </a:defRPr>
+            </a:lvl3pPr>
+            <a:lvl4pPr marL="1143000" indent="-228600" algn="l" rtl="0" eaLnBrk="1" latinLnBrk="0" hangingPunct="1">
+              <a:spcBef>
+                <a:spcPts val="350"/>
+              </a:spcBef>
+              <a:buClr>
+                <a:schemeClr val="accent2"/>
+              </a:buClr>
+              <a:buFont typeface="Wingdings 2"/>
+              <a:buChar char=""/>
+              <a:defRPr kumimoji="0" sz="1900" kern="1200">
+                <a:solidFill>
+                  <a:schemeClr val="tx1"/>
+                </a:solidFill>
+                <a:latin typeface="+mn-lt"/>
+                <a:ea typeface="+mn-ea"/>
+                <a:cs typeface="+mn-cs"/>
+              </a:defRPr>
+            </a:lvl4pPr>
+            <a:lvl5pPr marL="1371600" indent="-228600" algn="l" rtl="0" eaLnBrk="1" latinLnBrk="0" hangingPunct="1">
+              <a:spcBef>
+                <a:spcPts val="350"/>
+              </a:spcBef>
+              <a:buClr>
+                <a:schemeClr val="accent2"/>
+              </a:buClr>
+              <a:buFont typeface="Wingdings 2"/>
+              <a:buChar char=""/>
+              <a:defRPr kumimoji="0" sz="1800" kern="1200">
+                <a:solidFill>
+                  <a:schemeClr val="tx1"/>
+                </a:solidFill>
+                <a:latin typeface="+mn-lt"/>
+                <a:ea typeface="+mn-ea"/>
+                <a:cs typeface="+mn-cs"/>
+              </a:defRPr>
+            </a:lvl5pPr>
+            <a:lvl6pPr marL="1600200" indent="-228600" algn="l" rtl="0" eaLnBrk="1" latinLnBrk="0" hangingPunct="1">
+              <a:spcBef>
+                <a:spcPts val="350"/>
+              </a:spcBef>
+              <a:buClr>
+                <a:schemeClr val="accent3"/>
+              </a:buClr>
+              <a:buFont typeface="Wingdings 2"/>
+              <a:buChar char=""/>
+              <a:defRPr kumimoji="0" sz="1800" kern="1200">
+                <a:solidFill>
+                  <a:schemeClr val="tx1"/>
+                </a:solidFill>
+                <a:latin typeface="+mn-lt"/>
+                <a:ea typeface="+mn-ea"/>
+                <a:cs typeface="+mn-cs"/>
+              </a:defRPr>
+            </a:lvl6pPr>
+            <a:lvl7pPr marL="1828800" indent="-228600" algn="l" rtl="0" eaLnBrk="1" latinLnBrk="0" hangingPunct="1">
+              <a:spcBef>
+                <a:spcPts val="350"/>
+              </a:spcBef>
+              <a:buClr>
+                <a:schemeClr val="accent3"/>
+              </a:buClr>
+              <a:buFont typeface="Wingdings 2"/>
+              <a:buChar char=""/>
+              <a:defRPr kumimoji="0" sz="1600" kern="1200">
+                <a:solidFill>
+                  <a:schemeClr val="tx1"/>
+                </a:solidFill>
+                <a:latin typeface="+mn-lt"/>
+                <a:ea typeface="+mn-ea"/>
+                <a:cs typeface="+mn-cs"/>
+              </a:defRPr>
+            </a:lvl7pPr>
+            <a:lvl8pPr marL="2057400" indent="-228600" algn="l" rtl="0" eaLnBrk="1" latinLnBrk="0" hangingPunct="1">
+              <a:spcBef>
+                <a:spcPts val="350"/>
+              </a:spcBef>
+              <a:buClr>
+                <a:schemeClr val="accent3"/>
+              </a:buClr>
+              <a:buFont typeface="Wingdings 2"/>
+              <a:buChar char=""/>
+              <a:defRPr kumimoji="0" sz="1600" kern="1200">
+                <a:solidFill>
+                  <a:schemeClr val="tx1"/>
+                </a:solidFill>
+                <a:latin typeface="+mn-lt"/>
+                <a:ea typeface="+mn-ea"/>
+                <a:cs typeface="+mn-cs"/>
+              </a:defRPr>
+            </a:lvl8pPr>
+            <a:lvl9pPr marL="2286000" indent="-228600" algn="l" rtl="0" eaLnBrk="1" latinLnBrk="0" hangingPunct="1">
+              <a:spcBef>
+                <a:spcPts val="350"/>
+              </a:spcBef>
+              <a:buClr>
+                <a:schemeClr val="accent3"/>
+              </a:buClr>
+              <a:buFont typeface="Wingdings 2"/>
+              <a:buChar char=""/>
+              <a:defRPr kumimoji="0" sz="1600" kern="1200" baseline="0">
+                <a:solidFill>
+                  <a:schemeClr val="tx1"/>
+                </a:solidFill>
+                <a:latin typeface="+mn-lt"/>
+                <a:ea typeface="+mn-ea"/>
+                <a:cs typeface="+mn-cs"/>
+              </a:defRPr>
+            </a:lvl9pPr>
+            <a:extLst/>
+          </a:lstStyle>
+          <a:p>
+            <a:r>
+              <a:rPr lang="de-DE" sz="2400" dirty="0" smtClean="0"/>
+              <a:t>Datei einlesen</a:t>
+            </a:r>
+          </a:p>
+          <a:p>
+            <a:r>
+              <a:rPr lang="de-DE" sz="2400" dirty="0" smtClean="0"/>
+              <a:t>Koordinaten transformieren</a:t>
+            </a:r>
+          </a:p>
+          <a:p>
+            <a:r>
+              <a:rPr lang="de-DE" sz="2400" dirty="0" smtClean="0"/>
+              <a:t>Polygone -&gt;Vertices</a:t>
+            </a:r>
+          </a:p>
+          <a:p>
+            <a:r>
+              <a:rPr lang="de-DE" sz="2400" dirty="0" smtClean="0"/>
+              <a:t>Building Objects erstellen </a:t>
+            </a:r>
+          </a:p>
+          <a:p>
+            <a:endParaRPr lang="de-DE" sz="2400" dirty="0" smtClean="0"/>
+          </a:p>
+          <a:p>
+            <a:endParaRPr lang="de-DE" sz="2400" dirty="0" smtClean="0"/>
+          </a:p>
+          <a:p>
+            <a:endParaRPr lang="de-DE" dirty="0"/>
+          </a:p>
+        </p:txBody>
+      </p:sp>
     </p:spTree>
     <p:extLst>
       <p:ext uri="{BB962C8B-B14F-4D97-AF65-F5344CB8AC3E}">
@@ -9886,15 +10955,7 @@
           <a:p>
             <a:r>
               <a:rPr lang="de-DE" dirty="0" smtClean="0"/>
-              <a:t>Durchgeführt </a:t>
-            </a:r>
-            <a:r>
-              <a:rPr lang="de-DE" dirty="0" smtClean="0"/>
-              <a:t>mithilfe homogener </a:t>
-            </a:r>
-            <a:r>
-              <a:rPr lang="de-DE" dirty="0" smtClean="0"/>
-              <a:t>Koordinaten</a:t>
+              <a:t>Durchgeführt mithilfe homogener Koordinaten</a:t>
             </a:r>
           </a:p>
           <a:p>
@@ -11175,11 +12236,7 @@
           <a:p>
             <a:r>
               <a:rPr lang="de-DE" dirty="0" smtClean="0"/>
-              <a:t>Wird </a:t>
-            </a:r>
-            <a:r>
-              <a:rPr lang="de-DE" dirty="0" smtClean="0"/>
-              <a:t>benötigt um konkave Polygone zeichnen zu können</a:t>
+              <a:t>Wird benötigt um konkave Polygone zeichnen zu können</a:t>
             </a:r>
           </a:p>
           <a:p>
@@ -21763,15 +22820,7 @@
           <a:p>
             <a:r>
               <a:rPr lang="de-DE" dirty="0" smtClean="0"/>
-              <a:t>Bild auf Seite </a:t>
-            </a:r>
-            <a:r>
-              <a:rPr lang="de-DE" dirty="0" smtClean="0"/>
-              <a:t>56:</a:t>
-            </a:r>
-            <a:r>
-              <a:rPr lang="de-DE" dirty="0" smtClean="0"/>
-              <a:t/>
+              <a:t>Bild auf Seite 56:</a:t>
             </a:r>
             <a:br>
               <a:rPr lang="de-DE" dirty="0" smtClean="0"/>
@@ -22030,11 +23079,7 @@
             </a:r>
             <a:r>
               <a:rPr lang="de-DE" dirty="0" smtClean="0"/>
-              <a:t>33 </a:t>
-            </a:r>
-            <a:r>
-              <a:rPr lang="de-DE" dirty="0" smtClean="0"/>
-              <a:t>vgl:</a:t>
+              <a:t>33 vgl:</a:t>
             </a:r>
             <a:r>
               <a:rPr lang="de-DE" u="sng" dirty="0">

</xml_diff>

<commit_message>
fix final fix fasdfasdfasdfasdf
</commit_message>
<xml_diff>
--- a/doku/präsentation nicht komplett/vCity-Präsentation.pptx
+++ b/doku/präsentation nicht komplett/vCity-Präsentation.pptx
@@ -188,7 +188,7 @@
   </p:defaultTextStyle>
   <p:extLst>
     <p:ext uri="{EFAFB233-063F-42B5-8137-9DF3F51BA10A}">
-      <p15:sldGuideLst xmlns:p15="http://schemas.microsoft.com/office/powerpoint/2012/main" xmlns="">
+      <p15:sldGuideLst xmlns="" xmlns:p15="http://schemas.microsoft.com/office/powerpoint/2012/main">
         <p15:guide id="1" orient="horz" pos="2160">
           <p15:clr>
             <a:srgbClr val="A4A3A4"/>
@@ -8790,7 +8790,15 @@
           <a:p>
             <a:r>
               <a:rPr lang="de-DE" dirty="0" smtClean="0"/>
-              <a:t>Dreiecke in ein ArrayList speichern</a:t>
+              <a:t>Dreiecke in </a:t>
+            </a:r>
+            <a:r>
+              <a:rPr lang="de-DE" dirty="0" smtClean="0"/>
+              <a:t>einer </a:t>
+            </a:r>
+            <a:r>
+              <a:rPr lang="de-DE" dirty="0" smtClean="0"/>
+              <a:t>ArrayList speichern</a:t>
             </a:r>
             <a:endParaRPr lang="de-DE" dirty="0"/>
           </a:p>
@@ -9000,7 +9008,15 @@
             </a:r>
             <a:r>
               <a:rPr lang="de-DE" sz="2400" dirty="0" smtClean="0"/>
-              <a:t>Neue Koordinaten in ein ArrayList weitergeben</a:t>
+              <a:t>Neue Koordinaten in </a:t>
+            </a:r>
+            <a:r>
+              <a:rPr lang="de-DE" sz="2400" dirty="0" smtClean="0"/>
+              <a:t>eine </a:t>
+            </a:r>
+            <a:r>
+              <a:rPr lang="de-DE" sz="2400" dirty="0" smtClean="0"/>
+              <a:t>ArrayList weitergeben</a:t>
             </a:r>
           </a:p>
           <a:p>
@@ -9599,11 +9615,7 @@
             </a:r>
             <a:r>
               <a:rPr lang="de-DE" sz="2400" smtClean="0"/>
-              <a:t>gegen </a:t>
-            </a:r>
-            <a:r>
-              <a:rPr lang="de-DE" sz="2400" smtClean="0"/>
-              <a:t>den </a:t>
+              <a:t>gegen den </a:t>
             </a:r>
             <a:r>
               <a:rPr lang="de-DE" sz="2400" dirty="0" smtClean="0"/>
@@ -10912,6 +10924,13 @@
   <p:clrMapOvr>
     <a:masterClrMapping/>
   </p:clrMapOvr>
+  <p:timing>
+    <p:tnLst>
+      <p:par>
+        <p:cTn id="1" dur="indefinite" restart="never" nodeType="tmRoot"/>
+      </p:par>
+    </p:tnLst>
+  </p:timing>
 </p:sld>
 </file>
 
@@ -13583,7 +13602,11 @@
           <a:p>
             <a:r>
               <a:rPr lang="de-DE" dirty="0" smtClean="0"/>
-              <a:t>Dreiecke haben den gleichen Startpunkt und die Seiten sind miteinander Verbunden</a:t>
+              <a:t>Dreiecke haben den gleichen Startpunkt und die Seiten sind miteinander </a:t>
+            </a:r>
+            <a:r>
+              <a:rPr lang="de-DE" dirty="0" smtClean="0"/>
+              <a:t>verbunden</a:t>
             </a:r>
             <a:endParaRPr lang="de-DE" dirty="0"/>
           </a:p>
@@ -19938,7 +19961,11 @@
           <a:p>
             <a:r>
               <a:rPr lang="de-DE" dirty="0" smtClean="0"/>
-              <a:t>Speicher alles auf die Grafikkarte und starte die Berechnung</a:t>
+              <a:t>Speichere </a:t>
+            </a:r>
+            <a:r>
+              <a:rPr lang="de-DE" dirty="0" smtClean="0"/>
+              <a:t>alles auf die Grafikkarte und starte die Berechnung</a:t>
             </a:r>
             <a:endParaRPr lang="de-DE" dirty="0"/>
           </a:p>

</xml_diff>